<commit_message>
add 2.6 part 1
</commit_message>
<xml_diff>
--- a/neo4j/import_data_fundamentals/Importing_Data_Fundamentals.pptx
+++ b/neo4j/import_data_fundamentals/Importing_Data_Fundamentals.pptx
@@ -20185,10 +20185,10 @@
       </p:sp>
       <p:pic>
         <p:nvPicPr>
-          <p:cNvPr id="4" name="Picture 3">
+          <p:cNvPr id="7" name="Picture 6">
             <a:extLst>
               <a:ext uri="{FF2B5EF4-FFF2-40B4-BE49-F238E27FC236}">
-                <a16:creationId xmlns:a16="http://schemas.microsoft.com/office/drawing/2014/main" id="{6BDFDAD6-DB8B-944D-449B-051F3812C0DA}"/>
+                <a16:creationId xmlns:a16="http://schemas.microsoft.com/office/drawing/2014/main" id="{403DB5FE-BB39-47E9-0FDE-DDD1F22B50C0}"/>
               </a:ext>
             </a:extLst>
           </p:cNvPr>
@@ -20205,8 +20205,8 @@
         </p:blipFill>
         <p:spPr>
           <a:xfrm>
-            <a:off x="455612" y="1562887"/>
-            <a:ext cx="9783012" cy="4775641"/>
+            <a:off x="469973" y="1524803"/>
+            <a:ext cx="10102718" cy="4799797"/>
           </a:xfrm>
           <a:prstGeom prst="roundRect">
             <a:avLst>
@@ -20505,10 +20505,10 @@
       </p:sp>
       <p:pic>
         <p:nvPicPr>
-          <p:cNvPr id="7" name="Picture 6">
+          <p:cNvPr id="4" name="Picture 3">
             <a:extLst>
               <a:ext uri="{FF2B5EF4-FFF2-40B4-BE49-F238E27FC236}">
-                <a16:creationId xmlns:a16="http://schemas.microsoft.com/office/drawing/2014/main" id="{8766A288-372F-31FD-837D-329B3231F047}"/>
+                <a16:creationId xmlns:a16="http://schemas.microsoft.com/office/drawing/2014/main" id="{FF85BA73-1D92-39D2-BC2A-3958E7B341A9}"/>
               </a:ext>
             </a:extLst>
           </p:cNvPr>
@@ -20525,8 +20525,8 @@
         </p:blipFill>
         <p:spPr>
           <a:xfrm>
-            <a:off x="303212" y="1447800"/>
-            <a:ext cx="9972985" cy="4884100"/>
+            <a:off x="379413" y="1513660"/>
+            <a:ext cx="10308169" cy="4887140"/>
           </a:xfrm>
           <a:prstGeom prst="roundRect">
             <a:avLst>

</xml_diff>